<commit_message>
added quiz01 and its solutions
</commit_message>
<xml_diff>
--- a/LEC/lec04-structured-data-queries-terminal/lec-structured-data-queries-terminal.pptx
+++ b/LEC/lec04-structured-data-queries-terminal/lec-structured-data-queries-terminal.pptx
@@ -135,21 +135,12 @@
 </p:presentation>
 </file>
 
-<file path=ppt/revisionInfo.xml><?xml version="1.0" encoding="utf-8"?>
-<p1510:revInfo xmlns:a="http://schemas.openxmlformats.org/drawingml/2006/main" xmlns:r="http://schemas.openxmlformats.org/officeDocument/2006/relationships" xmlns:p1510="http://schemas.microsoft.com/office/powerpoint/2015/10/main">
-  <p1510:revLst>
-    <p1510:client id="{233C1180-84D2-4934-A196-9A37E921C3B1}" v="300" dt="2026-02-04T18:12:19.468"/>
-    <p1510:client id="{4238A2A2-0B77-9D22-EA12-AE690F4302F3}" v="281" dt="2026-02-04T01:00:50.480"/>
-  </p1510:revLst>
-</p1510:revInfo>
-</file>
-
 <file path=ppt/changesInfos/changesInfo1.xml><?xml version="1.0" encoding="utf-8"?>
 <pc:chgInfo xmlns:a="http://schemas.openxmlformats.org/drawingml/2006/main" xmlns:r="http://schemas.openxmlformats.org/officeDocument/2006/relationships" xmlns:ac="http://schemas.microsoft.com/office/drawing/2013/main/command" xmlns:pc="http://schemas.microsoft.com/office/powerpoint/2013/main/command">
   <pc:docChgLst>
     <pc:chgData name="Frommer, Ian Dr. (EDU)" userId="28ca3ff0-544f-450a-928b-99e19cf49b89" providerId="ADAL" clId="{FDDA6EB0-4FD6-4516-ACA5-A4CAC6441DA7}"/>
     <pc:docChg chg="undo redo custSel addSld delSld modSld sldOrd">
-      <pc:chgData name="Frommer, Ian Dr. (EDU)" userId="28ca3ff0-544f-450a-928b-99e19cf49b89" providerId="ADAL" clId="{FDDA6EB0-4FD6-4516-ACA5-A4CAC6441DA7}" dt="2026-02-04T18:12:29.164" v="9301" actId="115"/>
+      <pc:chgData name="Frommer, Ian Dr. (EDU)" userId="28ca3ff0-544f-450a-928b-99e19cf49b89" providerId="ADAL" clId="{FDDA6EB0-4FD6-4516-ACA5-A4CAC6441DA7}" dt="2026-02-11T16:18:19.736" v="9303" actId="1035"/>
       <pc:docMkLst>
         <pc:docMk/>
       </pc:docMkLst>
@@ -165,22 +156,6 @@
             <pc:docMk/>
             <pc:sldMk cId="2748088551" sldId="256"/>
             <ac:spMk id="2" creationId="{CB75BEAD-B1E3-28B9-2DBE-1E1D6F4CFAAC}"/>
-          </ac:spMkLst>
-        </pc:spChg>
-        <pc:spChg chg="add del">
-          <ac:chgData name="Frommer, Ian Dr. (EDU)" userId="28ca3ff0-544f-450a-928b-99e19cf49b89" providerId="ADAL" clId="{FDDA6EB0-4FD6-4516-ACA5-A4CAC6441DA7}" dt="2026-02-03T04:03:59.820" v="657" actId="478"/>
-          <ac:spMkLst>
-            <pc:docMk/>
-            <pc:sldMk cId="2748088551" sldId="256"/>
-            <ac:spMk id="3" creationId="{EDFAB1E2-C824-5413-2757-EC552697BAE3}"/>
-          </ac:spMkLst>
-        </pc:spChg>
-        <pc:spChg chg="add del">
-          <ac:chgData name="Frommer, Ian Dr. (EDU)" userId="28ca3ff0-544f-450a-928b-99e19cf49b89" providerId="ADAL" clId="{FDDA6EB0-4FD6-4516-ACA5-A4CAC6441DA7}" dt="2026-02-03T04:03:16.981" v="617" actId="22"/>
-          <ac:spMkLst>
-            <pc:docMk/>
-            <pc:sldMk cId="2748088551" sldId="256"/>
-            <ac:spMk id="5" creationId="{88A2D979-7F2E-FD98-235E-6999B628D2F6}"/>
           </ac:spMkLst>
         </pc:spChg>
       </pc:sldChg>
@@ -276,82 +251,6 @@
           </ac:spMkLst>
         </pc:spChg>
       </pc:sldChg>
-      <pc:sldChg chg="modSp new del mod">
-        <pc:chgData name="Frommer, Ian Dr. (EDU)" userId="28ca3ff0-544f-450a-928b-99e19cf49b89" providerId="ADAL" clId="{FDDA6EB0-4FD6-4516-ACA5-A4CAC6441DA7}" dt="2026-02-04T13:44:59.600" v="4097" actId="47"/>
-        <pc:sldMkLst>
-          <pc:docMk/>
-          <pc:sldMk cId="3355332426" sldId="261"/>
-        </pc:sldMkLst>
-        <pc:spChg chg="mod">
-          <ac:chgData name="Frommer, Ian Dr. (EDU)" userId="28ca3ff0-544f-450a-928b-99e19cf49b89" providerId="ADAL" clId="{FDDA6EB0-4FD6-4516-ACA5-A4CAC6441DA7}" dt="2026-02-04T13:44:29.648" v="4096" actId="21"/>
-          <ac:spMkLst>
-            <pc:docMk/>
-            <pc:sldMk cId="3355332426" sldId="261"/>
-            <ac:spMk id="3" creationId="{948D8738-363A-4505-B5E3-48BF5AEA85B9}"/>
-          </ac:spMkLst>
-        </pc:spChg>
-      </pc:sldChg>
-      <pc:sldChg chg="modSp new del mod">
-        <pc:chgData name="Frommer, Ian Dr. (EDU)" userId="28ca3ff0-544f-450a-928b-99e19cf49b89" providerId="ADAL" clId="{FDDA6EB0-4FD6-4516-ACA5-A4CAC6441DA7}" dt="2026-02-04T13:43:29.632" v="4076" actId="47"/>
-        <pc:sldMkLst>
-          <pc:docMk/>
-          <pc:sldMk cId="1422796911" sldId="262"/>
-        </pc:sldMkLst>
-        <pc:spChg chg="mod">
-          <ac:chgData name="Frommer, Ian Dr. (EDU)" userId="28ca3ff0-544f-450a-928b-99e19cf49b89" providerId="ADAL" clId="{FDDA6EB0-4FD6-4516-ACA5-A4CAC6441DA7}" dt="2026-02-03T02:59:30.786" v="206" actId="27636"/>
-          <ac:spMkLst>
-            <pc:docMk/>
-            <pc:sldMk cId="1422796911" sldId="262"/>
-            <ac:spMk id="2" creationId="{74FA3782-7DE4-2A5B-782C-65735E0F583B}"/>
-          </ac:spMkLst>
-        </pc:spChg>
-        <pc:spChg chg="mod">
-          <ac:chgData name="Frommer, Ian Dr. (EDU)" userId="28ca3ff0-544f-450a-928b-99e19cf49b89" providerId="ADAL" clId="{FDDA6EB0-4FD6-4516-ACA5-A4CAC6441DA7}" dt="2026-02-04T13:43:23.200" v="4074" actId="21"/>
-          <ac:spMkLst>
-            <pc:docMk/>
-            <pc:sldMk cId="1422796911" sldId="262"/>
-            <ac:spMk id="3" creationId="{9682CD84-5BF6-F1EC-D78D-71E4DC476616}"/>
-          </ac:spMkLst>
-        </pc:spChg>
-      </pc:sldChg>
-      <pc:sldChg chg="modSp new del mod">
-        <pc:chgData name="Frommer, Ian Dr. (EDU)" userId="28ca3ff0-544f-450a-928b-99e19cf49b89" providerId="ADAL" clId="{FDDA6EB0-4FD6-4516-ACA5-A4CAC6441DA7}" dt="2026-02-04T13:44:05.856" v="4088" actId="2696"/>
-        <pc:sldMkLst>
-          <pc:docMk/>
-          <pc:sldMk cId="1909394966" sldId="263"/>
-        </pc:sldMkLst>
-        <pc:spChg chg="mod">
-          <ac:chgData name="Frommer, Ian Dr. (EDU)" userId="28ca3ff0-544f-450a-928b-99e19cf49b89" providerId="ADAL" clId="{FDDA6EB0-4FD6-4516-ACA5-A4CAC6441DA7}" dt="2026-02-04T13:43:56.188" v="4084" actId="27636"/>
-          <ac:spMkLst>
-            <pc:docMk/>
-            <pc:sldMk cId="1909394966" sldId="263"/>
-            <ac:spMk id="3" creationId="{8928DAFC-AC26-E8DB-D396-0F9BBBD7E50B}"/>
-          </ac:spMkLst>
-        </pc:spChg>
-      </pc:sldChg>
-      <pc:sldChg chg="modSp new del mod">
-        <pc:chgData name="Frommer, Ian Dr. (EDU)" userId="28ca3ff0-544f-450a-928b-99e19cf49b89" providerId="ADAL" clId="{FDDA6EB0-4FD6-4516-ACA5-A4CAC6441DA7}" dt="2026-02-04T14:42:25.076" v="5397" actId="47"/>
-        <pc:sldMkLst>
-          <pc:docMk/>
-          <pc:sldMk cId="3938811188" sldId="264"/>
-        </pc:sldMkLst>
-        <pc:spChg chg="mod">
-          <ac:chgData name="Frommer, Ian Dr. (EDU)" userId="28ca3ff0-544f-450a-928b-99e19cf49b89" providerId="ADAL" clId="{FDDA6EB0-4FD6-4516-ACA5-A4CAC6441DA7}" dt="2026-02-04T13:44:18.377" v="4095" actId="20577"/>
-          <ac:spMkLst>
-            <pc:docMk/>
-            <pc:sldMk cId="3938811188" sldId="264"/>
-            <ac:spMk id="2" creationId="{BC965366-F030-B77C-12F0-C3C53A6D162A}"/>
-          </ac:spMkLst>
-        </pc:spChg>
-        <pc:spChg chg="mod">
-          <ac:chgData name="Frommer, Ian Dr. (EDU)" userId="28ca3ff0-544f-450a-928b-99e19cf49b89" providerId="ADAL" clId="{FDDA6EB0-4FD6-4516-ACA5-A4CAC6441DA7}" dt="2026-02-04T14:02:54.819" v="4189" actId="21"/>
-          <ac:spMkLst>
-            <pc:docMk/>
-            <pc:sldMk cId="3938811188" sldId="264"/>
-            <ac:spMk id="3" creationId="{1417D2B0-CA2C-05FA-B34B-6858AD60538A}"/>
-          </ac:spMkLst>
-        </pc:spChg>
-      </pc:sldChg>
       <pc:sldChg chg="addSp modSp new mod ord modAnim">
         <pc:chgData name="Frommer, Ian Dr. (EDU)" userId="28ca3ff0-544f-450a-928b-99e19cf49b89" providerId="ADAL" clId="{FDDA6EB0-4FD6-4516-ACA5-A4CAC6441DA7}" dt="2026-02-04T13:18:34.144" v="3411" actId="1036"/>
         <pc:sldMkLst>
@@ -382,20 +281,6 @@
             <ac:spMk id="4" creationId="{47D55C77-9A7C-B14B-B812-8001570D0B95}"/>
           </ac:spMkLst>
         </pc:spChg>
-      </pc:sldChg>
-      <pc:sldChg chg="new del">
-        <pc:chgData name="Frommer, Ian Dr. (EDU)" userId="28ca3ff0-544f-450a-928b-99e19cf49b89" providerId="ADAL" clId="{FDDA6EB0-4FD6-4516-ACA5-A4CAC6441DA7}" dt="2026-02-04T14:42:29.307" v="5398" actId="47"/>
-        <pc:sldMkLst>
-          <pc:docMk/>
-          <pc:sldMk cId="4077854141" sldId="266"/>
-        </pc:sldMkLst>
-      </pc:sldChg>
-      <pc:sldChg chg="new del">
-        <pc:chgData name="Frommer, Ian Dr. (EDU)" userId="28ca3ff0-544f-450a-928b-99e19cf49b89" providerId="ADAL" clId="{FDDA6EB0-4FD6-4516-ACA5-A4CAC6441DA7}" dt="2026-02-04T14:42:31.334" v="5399" actId="47"/>
-        <pc:sldMkLst>
-          <pc:docMk/>
-          <pc:sldMk cId="3294430648" sldId="267"/>
-        </pc:sldMkLst>
       </pc:sldChg>
       <pc:sldChg chg="modSp new mod modAnim modNotesTx">
         <pc:chgData name="Frommer, Ian Dr. (EDU)" userId="28ca3ff0-544f-450a-928b-99e19cf49b89" providerId="ADAL" clId="{FDDA6EB0-4FD6-4516-ACA5-A4CAC6441DA7}" dt="2026-02-04T17:59:43.435" v="9137" actId="20577"/>
@@ -466,21 +351,6 @@
           </ac:spMkLst>
         </pc:spChg>
       </pc:sldChg>
-      <pc:sldChg chg="modSp new del mod">
-        <pc:chgData name="Frommer, Ian Dr. (EDU)" userId="28ca3ff0-544f-450a-928b-99e19cf49b89" providerId="ADAL" clId="{FDDA6EB0-4FD6-4516-ACA5-A4CAC6441DA7}" dt="2026-02-04T17:19:12.925" v="7578" actId="47"/>
-        <pc:sldMkLst>
-          <pc:docMk/>
-          <pc:sldMk cId="3371900304" sldId="271"/>
-        </pc:sldMkLst>
-        <pc:spChg chg="mod">
-          <ac:chgData name="Frommer, Ian Dr. (EDU)" userId="28ca3ff0-544f-450a-928b-99e19cf49b89" providerId="ADAL" clId="{FDDA6EB0-4FD6-4516-ACA5-A4CAC6441DA7}" dt="2026-02-04T17:19:06.467" v="7575" actId="21"/>
-          <ac:spMkLst>
-            <pc:docMk/>
-            <pc:sldMk cId="3371900304" sldId="271"/>
-            <ac:spMk id="3" creationId="{940044F5-A0EA-2011-D74A-D4634CAB7193}"/>
-          </ac:spMkLst>
-        </pc:spChg>
-      </pc:sldChg>
       <pc:sldChg chg="modSp new mod">
         <pc:chgData name="Frommer, Ian Dr. (EDU)" userId="28ca3ff0-544f-450a-928b-99e19cf49b89" providerId="ADAL" clId="{FDDA6EB0-4FD6-4516-ACA5-A4CAC6441DA7}" dt="2026-02-04T18:11:28.317" v="9281" actId="20577"/>
         <pc:sldMkLst>
@@ -504,44 +374,6 @@
           </ac:spMkLst>
         </pc:spChg>
       </pc:sldChg>
-      <pc:sldChg chg="modSp new del mod">
-        <pc:chgData name="Frommer, Ian Dr. (EDU)" userId="28ca3ff0-544f-450a-928b-99e19cf49b89" providerId="ADAL" clId="{FDDA6EB0-4FD6-4516-ACA5-A4CAC6441DA7}" dt="2026-02-04T17:29:36.906" v="8183" actId="47"/>
-        <pc:sldMkLst>
-          <pc:docMk/>
-          <pc:sldMk cId="172804446" sldId="273"/>
-        </pc:sldMkLst>
-        <pc:spChg chg="mod">
-          <ac:chgData name="Frommer, Ian Dr. (EDU)" userId="28ca3ff0-544f-450a-928b-99e19cf49b89" providerId="ADAL" clId="{FDDA6EB0-4FD6-4516-ACA5-A4CAC6441DA7}" dt="2026-02-03T20:31:40.974" v="2024" actId="20577"/>
-          <ac:spMkLst>
-            <pc:docMk/>
-            <pc:sldMk cId="172804446" sldId="273"/>
-            <ac:spMk id="2" creationId="{4CB985BA-98E3-6CFB-B18A-43856964C5A1}"/>
-          </ac:spMkLst>
-        </pc:spChg>
-        <pc:spChg chg="mod">
-          <ac:chgData name="Frommer, Ian Dr. (EDU)" userId="28ca3ff0-544f-450a-928b-99e19cf49b89" providerId="ADAL" clId="{FDDA6EB0-4FD6-4516-ACA5-A4CAC6441DA7}" dt="2026-02-04T17:19:32.938" v="7579" actId="21"/>
-          <ac:spMkLst>
-            <pc:docMk/>
-            <pc:sldMk cId="172804446" sldId="273"/>
-            <ac:spMk id="3" creationId="{FDFD0392-C00A-65FE-BEEE-43678DABA5C7}"/>
-          </ac:spMkLst>
-        </pc:spChg>
-      </pc:sldChg>
-      <pc:sldChg chg="modSp new mod">
-        <pc:chgData name="Frommer, Ian Dr. (EDU)" userId="28ca3ff0-544f-450a-928b-99e19cf49b89" providerId="ADAL" clId="{FDDA6EB0-4FD6-4516-ACA5-A4CAC6441DA7}" dt="2026-02-03T21:19:34.819" v="2105" actId="20577"/>
-        <pc:sldMkLst>
-          <pc:docMk/>
-          <pc:sldMk cId="2856696756" sldId="274"/>
-        </pc:sldMkLst>
-        <pc:spChg chg="mod">
-          <ac:chgData name="Frommer, Ian Dr. (EDU)" userId="28ca3ff0-544f-450a-928b-99e19cf49b89" providerId="ADAL" clId="{FDDA6EB0-4FD6-4516-ACA5-A4CAC6441DA7}" dt="2026-02-03T21:19:34.819" v="2105" actId="20577"/>
-          <ac:spMkLst>
-            <pc:docMk/>
-            <pc:sldMk cId="2856696756" sldId="274"/>
-            <ac:spMk id="3" creationId="{49C78E02-3E51-EA3E-AFAD-D8CACDB32BA9}"/>
-          </ac:spMkLst>
-        </pc:spChg>
-      </pc:sldChg>
       <pc:sldChg chg="modSp new mod">
         <pc:chgData name="Frommer, Ian Dr. (EDU)" userId="28ca3ff0-544f-450a-928b-99e19cf49b89" providerId="ADAL" clId="{FDDA6EB0-4FD6-4516-ACA5-A4CAC6441DA7}" dt="2026-02-04T18:12:29.164" v="9301" actId="115"/>
         <pc:sldMkLst>
@@ -562,59 +394,6 @@
             <pc:docMk/>
             <pc:sldMk cId="75432030" sldId="275"/>
             <ac:spMk id="3" creationId="{ADB60CB3-D6B3-5099-E9C0-60BC41182B8E}"/>
-          </ac:spMkLst>
-        </pc:spChg>
-      </pc:sldChg>
-      <pc:sldChg chg="modSp new del mod">
-        <pc:chgData name="Frommer, Ian Dr. (EDU)" userId="28ca3ff0-544f-450a-928b-99e19cf49b89" providerId="ADAL" clId="{FDDA6EB0-4FD6-4516-ACA5-A4CAC6441DA7}" dt="2026-02-04T18:12:22.877" v="9299" actId="47"/>
-        <pc:sldMkLst>
-          <pc:docMk/>
-          <pc:sldMk cId="2312030045" sldId="276"/>
-        </pc:sldMkLst>
-        <pc:spChg chg="mod">
-          <ac:chgData name="Frommer, Ian Dr. (EDU)" userId="28ca3ff0-544f-450a-928b-99e19cf49b89" providerId="ADAL" clId="{FDDA6EB0-4FD6-4516-ACA5-A4CAC6441DA7}" dt="2026-02-04T18:12:15.477" v="9295" actId="21"/>
-          <ac:spMkLst>
-            <pc:docMk/>
-            <pc:sldMk cId="2312030045" sldId="276"/>
-            <ac:spMk id="2" creationId="{776062DA-70ED-CC84-DA18-9CA49C59618D}"/>
-          </ac:spMkLst>
-        </pc:spChg>
-        <pc:spChg chg="mod">
-          <ac:chgData name="Frommer, Ian Dr. (EDU)" userId="28ca3ff0-544f-450a-928b-99e19cf49b89" providerId="ADAL" clId="{FDDA6EB0-4FD6-4516-ACA5-A4CAC6441DA7}" dt="2026-02-04T18:12:07.938" v="9290" actId="21"/>
-          <ac:spMkLst>
-            <pc:docMk/>
-            <pc:sldMk cId="2312030045" sldId="276"/>
-            <ac:spMk id="3" creationId="{1642165C-AB82-FF9D-D68D-7654752055F6}"/>
-          </ac:spMkLst>
-        </pc:spChg>
-      </pc:sldChg>
-      <pc:sldChg chg="modSp del mod">
-        <pc:chgData name="Frommer, Ian Dr. (EDU)" userId="28ca3ff0-544f-450a-928b-99e19cf49b89" providerId="ADAL" clId="{FDDA6EB0-4FD6-4516-ACA5-A4CAC6441DA7}" dt="2026-02-04T14:42:35.146" v="5400" actId="47"/>
-        <pc:sldMkLst>
-          <pc:docMk/>
-          <pc:sldMk cId="394230952" sldId="277"/>
-        </pc:sldMkLst>
-        <pc:spChg chg="mod">
-          <ac:chgData name="Frommer, Ian Dr. (EDU)" userId="28ca3ff0-544f-450a-928b-99e19cf49b89" providerId="ADAL" clId="{FDDA6EB0-4FD6-4516-ACA5-A4CAC6441DA7}" dt="2026-02-04T14:42:05.783" v="5392" actId="21"/>
-          <ac:spMkLst>
-            <pc:docMk/>
-            <pc:sldMk cId="394230952" sldId="277"/>
-            <ac:spMk id="3" creationId="{88164DA5-0BB9-BE45-9A90-145C02AA75B7}"/>
-          </ac:spMkLst>
-        </pc:spChg>
-      </pc:sldChg>
-      <pc:sldChg chg="modSp del mod ord">
-        <pc:chgData name="Frommer, Ian Dr. (EDU)" userId="28ca3ff0-544f-450a-928b-99e19cf49b89" providerId="ADAL" clId="{FDDA6EB0-4FD6-4516-ACA5-A4CAC6441DA7}" dt="2026-02-04T17:50:36.925" v="8688" actId="47"/>
-        <pc:sldMkLst>
-          <pc:docMk/>
-          <pc:sldMk cId="1022115385" sldId="278"/>
-        </pc:sldMkLst>
-        <pc:spChg chg="mod">
-          <ac:chgData name="Frommer, Ian Dr. (EDU)" userId="28ca3ff0-544f-450a-928b-99e19cf49b89" providerId="ADAL" clId="{FDDA6EB0-4FD6-4516-ACA5-A4CAC6441DA7}" dt="2026-02-04T17:50:24.289" v="8684" actId="21"/>
-          <ac:spMkLst>
-            <pc:docMk/>
-            <pc:sldMk cId="1022115385" sldId="278"/>
-            <ac:spMk id="3" creationId="{6DE6CFAC-C600-2AF5-81AD-7BD84AE9F7C8}"/>
           </ac:spMkLst>
         </pc:spChg>
       </pc:sldChg>
@@ -764,29 +543,6 @@
           </ac:spMkLst>
         </pc:spChg>
       </pc:sldChg>
-      <pc:sldChg chg="modSp new del mod">
-        <pc:chgData name="Frommer, Ian Dr. (EDU)" userId="28ca3ff0-544f-450a-928b-99e19cf49b89" providerId="ADAL" clId="{FDDA6EB0-4FD6-4516-ACA5-A4CAC6441DA7}" dt="2026-02-04T16:54:36.488" v="6699" actId="2696"/>
-        <pc:sldMkLst>
-          <pc:docMk/>
-          <pc:sldMk cId="3559666009" sldId="285"/>
-        </pc:sldMkLst>
-        <pc:spChg chg="mod">
-          <ac:chgData name="Frommer, Ian Dr. (EDU)" userId="28ca3ff0-544f-450a-928b-99e19cf49b89" providerId="ADAL" clId="{FDDA6EB0-4FD6-4516-ACA5-A4CAC6441DA7}" dt="2026-02-04T13:49:57.937" v="4188" actId="20577"/>
-          <ac:spMkLst>
-            <pc:docMk/>
-            <pc:sldMk cId="3559666009" sldId="285"/>
-            <ac:spMk id="2" creationId="{5D20545E-C29C-E322-4100-4A6FB54AAEB6}"/>
-          </ac:spMkLst>
-        </pc:spChg>
-        <pc:spChg chg="mod">
-          <ac:chgData name="Frommer, Ian Dr. (EDU)" userId="28ca3ff0-544f-450a-928b-99e19cf49b89" providerId="ADAL" clId="{FDDA6EB0-4FD6-4516-ACA5-A4CAC6441DA7}" dt="2026-02-04T16:50:59.902" v="6611" actId="21"/>
-          <ac:spMkLst>
-            <pc:docMk/>
-            <pc:sldMk cId="3559666009" sldId="285"/>
-            <ac:spMk id="3" creationId="{61C84542-ED14-893E-F800-14584E809BFC}"/>
-          </ac:spMkLst>
-        </pc:spChg>
-      </pc:sldChg>
       <pc:sldChg chg="modSp add mod modAnim modNotesTx">
         <pc:chgData name="Frommer, Ian Dr. (EDU)" userId="28ca3ff0-544f-450a-928b-99e19cf49b89" providerId="ADAL" clId="{FDDA6EB0-4FD6-4516-ACA5-A4CAC6441DA7}" dt="2026-02-04T17:04:24.938" v="7235"/>
         <pc:sldMkLst>
@@ -816,28 +572,12 @@
           <pc:docMk/>
           <pc:sldMk cId="2983722337" sldId="287"/>
         </pc:sldMkLst>
-        <pc:spChg chg="del">
-          <ac:chgData name="Frommer, Ian Dr. (EDU)" userId="28ca3ff0-544f-450a-928b-99e19cf49b89" providerId="ADAL" clId="{FDDA6EB0-4FD6-4516-ACA5-A4CAC6441DA7}" dt="2026-02-04T16:53:27.231" v="6680" actId="478"/>
-          <ac:spMkLst>
-            <pc:docMk/>
-            <pc:sldMk cId="2983722337" sldId="287"/>
-            <ac:spMk id="2" creationId="{3CF6A84F-B29E-039B-FDE3-C43C123909AB}"/>
-          </ac:spMkLst>
-        </pc:spChg>
         <pc:spChg chg="mod">
           <ac:chgData name="Frommer, Ian Dr. (EDU)" userId="28ca3ff0-544f-450a-928b-99e19cf49b89" providerId="ADAL" clId="{FDDA6EB0-4FD6-4516-ACA5-A4CAC6441DA7}" dt="2026-02-04T17:05:17.609" v="7284" actId="6549"/>
           <ac:spMkLst>
             <pc:docMk/>
             <pc:sldMk cId="2983722337" sldId="287"/>
             <ac:spMk id="3" creationId="{051716DF-17DC-3F52-75BC-AF835275A051}"/>
-          </ac:spMkLst>
-        </pc:spChg>
-        <pc:spChg chg="add del mod">
-          <ac:chgData name="Frommer, Ian Dr. (EDU)" userId="28ca3ff0-544f-450a-928b-99e19cf49b89" providerId="ADAL" clId="{FDDA6EB0-4FD6-4516-ACA5-A4CAC6441DA7}" dt="2026-02-04T16:53:04.684" v="6662" actId="478"/>
-          <ac:spMkLst>
-            <pc:docMk/>
-            <pc:sldMk cId="2983722337" sldId="287"/>
-            <ac:spMk id="5" creationId="{90AD1A23-BFA7-BE2A-33B5-DF1C867267F7}"/>
           </ac:spMkLst>
         </pc:spChg>
         <pc:spChg chg="add mod">
@@ -850,7 +590,7 @@
         </pc:spChg>
       </pc:sldChg>
       <pc:sldChg chg="addSp delSp modSp new mod">
-        <pc:chgData name="Frommer, Ian Dr. (EDU)" userId="28ca3ff0-544f-450a-928b-99e19cf49b89" providerId="ADAL" clId="{FDDA6EB0-4FD6-4516-ACA5-A4CAC6441DA7}" dt="2026-02-04T17:52:45.689" v="8848" actId="20577"/>
+        <pc:chgData name="Frommer, Ian Dr. (EDU)" userId="28ca3ff0-544f-450a-928b-99e19cf49b89" providerId="ADAL" clId="{FDDA6EB0-4FD6-4516-ACA5-A4CAC6441DA7}" dt="2026-02-11T16:18:19.736" v="9303" actId="1035"/>
         <pc:sldMkLst>
           <pc:docMk/>
           <pc:sldMk cId="391718266" sldId="288"/>
@@ -864,19 +604,11 @@
           </ac:spMkLst>
         </pc:spChg>
         <pc:spChg chg="mod">
-          <ac:chgData name="Frommer, Ian Dr. (EDU)" userId="28ca3ff0-544f-450a-928b-99e19cf49b89" providerId="ADAL" clId="{FDDA6EB0-4FD6-4516-ACA5-A4CAC6441DA7}" dt="2026-02-04T17:52:45.689" v="8848" actId="20577"/>
+          <ac:chgData name="Frommer, Ian Dr. (EDU)" userId="28ca3ff0-544f-450a-928b-99e19cf49b89" providerId="ADAL" clId="{FDDA6EB0-4FD6-4516-ACA5-A4CAC6441DA7}" dt="2026-02-11T16:18:19.736" v="9303" actId="1035"/>
           <ac:spMkLst>
             <pc:docMk/>
             <pc:sldMk cId="391718266" sldId="288"/>
             <ac:spMk id="3" creationId="{9D3F009A-8A0A-E9A2-DA95-46FBB20391F4}"/>
-          </ac:spMkLst>
-        </pc:spChg>
-        <pc:spChg chg="add del mod">
-          <ac:chgData name="Frommer, Ian Dr. (EDU)" userId="28ca3ff0-544f-450a-928b-99e19cf49b89" providerId="ADAL" clId="{FDDA6EB0-4FD6-4516-ACA5-A4CAC6441DA7}" dt="2026-02-04T17:47:30.730" v="8538"/>
-          <ac:spMkLst>
-            <pc:docMk/>
-            <pc:sldMk cId="391718266" sldId="288"/>
-            <ac:spMk id="5" creationId="{69513E0A-0D7B-2EBF-9648-C56D22277135}"/>
           </ac:spMkLst>
         </pc:spChg>
       </pc:sldChg>
@@ -1004,66 +736,6 @@
           </ac:spMkLst>
         </pc:spChg>
       </pc:sldChg>
-      <pc:sldChg chg="modSp">
-        <pc:chgData name="Frommer, Ian Dr. (EDU)" userId="S::ian.frommer@uscga.edu::28ca3ff0-544f-450a-928b-99e19cf49b89" providerId="AD" clId="Web-{4238A2A2-0B77-9D22-EA12-AE690F4302F3}" dt="2026-02-04T00:48:07.478" v="266" actId="20577"/>
-        <pc:sldMkLst>
-          <pc:docMk/>
-          <pc:sldMk cId="3371900304" sldId="271"/>
-        </pc:sldMkLst>
-        <pc:spChg chg="mod">
-          <ac:chgData name="Frommer, Ian Dr. (EDU)" userId="S::ian.frommer@uscga.edu::28ca3ff0-544f-450a-928b-99e19cf49b89" providerId="AD" clId="Web-{4238A2A2-0B77-9D22-EA12-AE690F4302F3}" dt="2026-02-04T00:48:07.478" v="266" actId="20577"/>
-          <ac:spMkLst>
-            <pc:docMk/>
-            <pc:sldMk cId="3371900304" sldId="271"/>
-            <ac:spMk id="3" creationId="{940044F5-A0EA-2011-D74A-D4634CAB7193}"/>
-          </ac:spMkLst>
-        </pc:spChg>
-      </pc:sldChg>
-      <pc:sldChg chg="modSp del">
-        <pc:chgData name="Frommer, Ian Dr. (EDU)" userId="S::ian.frommer@uscga.edu::28ca3ff0-544f-450a-928b-99e19cf49b89" providerId="AD" clId="Web-{4238A2A2-0B77-9D22-EA12-AE690F4302F3}" dt="2026-02-04T00:16:01.040" v="36"/>
-        <pc:sldMkLst>
-          <pc:docMk/>
-          <pc:sldMk cId="2856696756" sldId="274"/>
-        </pc:sldMkLst>
-        <pc:spChg chg="mod">
-          <ac:chgData name="Frommer, Ian Dr. (EDU)" userId="S::ian.frommer@uscga.edu::28ca3ff0-544f-450a-928b-99e19cf49b89" providerId="AD" clId="Web-{4238A2A2-0B77-9D22-EA12-AE690F4302F3}" dt="2026-02-04T00:14:28.522" v="8" actId="20577"/>
-          <ac:spMkLst>
-            <pc:docMk/>
-            <pc:sldMk cId="2856696756" sldId="274"/>
-            <ac:spMk id="3" creationId="{49C78E02-3E51-EA3E-AFAD-D8CACDB32BA9}"/>
-          </ac:spMkLst>
-        </pc:spChg>
-      </pc:sldChg>
-      <pc:sldChg chg="modSp new">
-        <pc:chgData name="Frommer, Ian Dr. (EDU)" userId="S::ian.frommer@uscga.edu::28ca3ff0-544f-450a-928b-99e19cf49b89" providerId="AD" clId="Web-{4238A2A2-0B77-9D22-EA12-AE690F4302F3}" dt="2026-02-04T00:30:02.583" v="193" actId="20577"/>
-        <pc:sldMkLst>
-          <pc:docMk/>
-          <pc:sldMk cId="394230952" sldId="277"/>
-        </pc:sldMkLst>
-        <pc:spChg chg="mod">
-          <ac:chgData name="Frommer, Ian Dr. (EDU)" userId="S::ian.frommer@uscga.edu::28ca3ff0-544f-450a-928b-99e19cf49b89" providerId="AD" clId="Web-{4238A2A2-0B77-9D22-EA12-AE690F4302F3}" dt="2026-02-04T00:30:02.583" v="193" actId="20577"/>
-          <ac:spMkLst>
-            <pc:docMk/>
-            <pc:sldMk cId="394230952" sldId="277"/>
-            <ac:spMk id="3" creationId="{88164DA5-0BB9-BE45-9A90-145C02AA75B7}"/>
-          </ac:spMkLst>
-        </pc:spChg>
-      </pc:sldChg>
-      <pc:sldChg chg="modSp new">
-        <pc:chgData name="Frommer, Ian Dr. (EDU)" userId="S::ian.frommer@uscga.edu::28ca3ff0-544f-450a-928b-99e19cf49b89" providerId="AD" clId="Web-{4238A2A2-0B77-9D22-EA12-AE690F4302F3}" dt="2026-02-04T01:00:47.401" v="271" actId="20577"/>
-        <pc:sldMkLst>
-          <pc:docMk/>
-          <pc:sldMk cId="1022115385" sldId="278"/>
-        </pc:sldMkLst>
-        <pc:spChg chg="mod">
-          <ac:chgData name="Frommer, Ian Dr. (EDU)" userId="S::ian.frommer@uscga.edu::28ca3ff0-544f-450a-928b-99e19cf49b89" providerId="AD" clId="Web-{4238A2A2-0B77-9D22-EA12-AE690F4302F3}" dt="2026-02-04T01:00:47.401" v="271" actId="20577"/>
-          <ac:spMkLst>
-            <pc:docMk/>
-            <pc:sldMk cId="1022115385" sldId="278"/>
-            <ac:spMk id="3" creationId="{6DE6CFAC-C600-2AF5-81AD-7BD84AE9F7C8}"/>
-          </ac:spMkLst>
-        </pc:spChg>
-      </pc:sldChg>
     </pc:docChg>
   </pc:docChgLst>
 </pc:chgInfo>
@@ -1151,7 +823,7 @@
           <a:p>
             <a:fld id="{36A817B2-B704-4AA9-963B-28BFAC303395}" type="datetimeFigureOut">
               <a:rPr lang="en-US" smtClean="0"/>
-              <a:t>2/4/2026</a:t>
+              <a:t>2/11/2026</a:t>
             </a:fld>
             <a:endParaRPr lang="en-US"/>
           </a:p>
@@ -1956,7 +1628,7 @@
           <a:p>
             <a:fld id="{9842942E-FCA7-43F2-859F-88C63DD3AABD}" type="datetimeFigureOut">
               <a:rPr lang="en-US" smtClean="0"/>
-              <a:t>2/4/2026</a:t>
+              <a:t>2/11/2026</a:t>
             </a:fld>
             <a:endParaRPr lang="en-US"/>
           </a:p>
@@ -2154,7 +1826,7 @@
           <a:p>
             <a:fld id="{9842942E-FCA7-43F2-859F-88C63DD3AABD}" type="datetimeFigureOut">
               <a:rPr lang="en-US" smtClean="0"/>
-              <a:t>2/4/2026</a:t>
+              <a:t>2/11/2026</a:t>
             </a:fld>
             <a:endParaRPr lang="en-US"/>
           </a:p>
@@ -2362,7 +2034,7 @@
           <a:p>
             <a:fld id="{9842942E-FCA7-43F2-859F-88C63DD3AABD}" type="datetimeFigureOut">
               <a:rPr lang="en-US" smtClean="0"/>
-              <a:t>2/4/2026</a:t>
+              <a:t>2/11/2026</a:t>
             </a:fld>
             <a:endParaRPr lang="en-US"/>
           </a:p>
@@ -2560,7 +2232,7 @@
           <a:p>
             <a:fld id="{9842942E-FCA7-43F2-859F-88C63DD3AABD}" type="datetimeFigureOut">
               <a:rPr lang="en-US" smtClean="0"/>
-              <a:t>2/4/2026</a:t>
+              <a:t>2/11/2026</a:t>
             </a:fld>
             <a:endParaRPr lang="en-US"/>
           </a:p>
@@ -2835,7 +2507,7 @@
           <a:p>
             <a:fld id="{9842942E-FCA7-43F2-859F-88C63DD3AABD}" type="datetimeFigureOut">
               <a:rPr lang="en-US" smtClean="0"/>
-              <a:t>2/4/2026</a:t>
+              <a:t>2/11/2026</a:t>
             </a:fld>
             <a:endParaRPr lang="en-US"/>
           </a:p>
@@ -3100,7 +2772,7 @@
           <a:p>
             <a:fld id="{9842942E-FCA7-43F2-859F-88C63DD3AABD}" type="datetimeFigureOut">
               <a:rPr lang="en-US" smtClean="0"/>
-              <a:t>2/4/2026</a:t>
+              <a:t>2/11/2026</a:t>
             </a:fld>
             <a:endParaRPr lang="en-US"/>
           </a:p>
@@ -3512,7 +3184,7 @@
           <a:p>
             <a:fld id="{9842942E-FCA7-43F2-859F-88C63DD3AABD}" type="datetimeFigureOut">
               <a:rPr lang="en-US" smtClean="0"/>
-              <a:t>2/4/2026</a:t>
+              <a:t>2/11/2026</a:t>
             </a:fld>
             <a:endParaRPr lang="en-US"/>
           </a:p>
@@ -3653,7 +3325,7 @@
           <a:p>
             <a:fld id="{9842942E-FCA7-43F2-859F-88C63DD3AABD}" type="datetimeFigureOut">
               <a:rPr lang="en-US" smtClean="0"/>
-              <a:t>2/4/2026</a:t>
+              <a:t>2/11/2026</a:t>
             </a:fld>
             <a:endParaRPr lang="en-US"/>
           </a:p>
@@ -3766,7 +3438,7 @@
           <a:p>
             <a:fld id="{9842942E-FCA7-43F2-859F-88C63DD3AABD}" type="datetimeFigureOut">
               <a:rPr lang="en-US" smtClean="0"/>
-              <a:t>2/4/2026</a:t>
+              <a:t>2/11/2026</a:t>
             </a:fld>
             <a:endParaRPr lang="en-US"/>
           </a:p>
@@ -4077,7 +3749,7 @@
           <a:p>
             <a:fld id="{9842942E-FCA7-43F2-859F-88C63DD3AABD}" type="datetimeFigureOut">
               <a:rPr lang="en-US" smtClean="0"/>
-              <a:t>2/4/2026</a:t>
+              <a:t>2/11/2026</a:t>
             </a:fld>
             <a:endParaRPr lang="en-US"/>
           </a:p>
@@ -4365,7 +4037,7 @@
           <a:p>
             <a:fld id="{9842942E-FCA7-43F2-859F-88C63DD3AABD}" type="datetimeFigureOut">
               <a:rPr lang="en-US" smtClean="0"/>
-              <a:t>2/4/2026</a:t>
+              <a:t>2/11/2026</a:t>
             </a:fld>
             <a:endParaRPr lang="en-US"/>
           </a:p>
@@ -4606,7 +4278,7 @@
           <a:p>
             <a:fld id="{9842942E-FCA7-43F2-859F-88C63DD3AABD}" type="datetimeFigureOut">
               <a:rPr lang="en-US" smtClean="0"/>
-              <a:t>2/4/2026</a:t>
+              <a:t>2/11/2026</a:t>
             </a:fld>
             <a:endParaRPr lang="en-US"/>
           </a:p>
@@ -8476,7 +8148,12 @@
             <p:ph idx="1"/>
           </p:nvPr>
         </p:nvSpPr>
-        <p:spPr/>
+        <p:spPr>
+          <a:xfrm>
+            <a:off x="838200" y="1793541"/>
+            <a:ext cx="10515600" cy="4351338"/>
+          </a:xfrm>
+        </p:spPr>
         <p:txBody>
           <a:bodyPr>
             <a:normAutofit fontScale="85000" lnSpcReduction="20000"/>

</xml_diff>